<commit_message>
Revealing Chapter 7, 8 for Python Book
</commit_message>
<xml_diff>
--- a/images/matlab_basics/2. variables/variable_icons.pptx
+++ b/images/matlab_basics/2. variables/variable_icons.pptx
@@ -261,7 +261,7 @@
           <a:p>
             <a:fld id="{FB4E8B56-EE13-4C77-84B6-FA7DE9B8063B}" type="datetimeFigureOut">
               <a:rPr lang="en-US" smtClean="0"/>
-              <a:t>1/3/2023</a:t>
+              <a:t>9/2/2024</a:t>
             </a:fld>
             <a:endParaRPr lang="en-US"/>
           </a:p>
@@ -459,7 +459,7 @@
           <a:p>
             <a:fld id="{FB4E8B56-EE13-4C77-84B6-FA7DE9B8063B}" type="datetimeFigureOut">
               <a:rPr lang="en-US" smtClean="0"/>
-              <a:t>1/3/2023</a:t>
+              <a:t>9/2/2024</a:t>
             </a:fld>
             <a:endParaRPr lang="en-US"/>
           </a:p>
@@ -667,7 +667,7 @@
           <a:p>
             <a:fld id="{FB4E8B56-EE13-4C77-84B6-FA7DE9B8063B}" type="datetimeFigureOut">
               <a:rPr lang="en-US" smtClean="0"/>
-              <a:t>1/3/2023</a:t>
+              <a:t>9/2/2024</a:t>
             </a:fld>
             <a:endParaRPr lang="en-US"/>
           </a:p>
@@ -865,7 +865,7 @@
           <a:p>
             <a:fld id="{FB4E8B56-EE13-4C77-84B6-FA7DE9B8063B}" type="datetimeFigureOut">
               <a:rPr lang="en-US" smtClean="0"/>
-              <a:t>1/3/2023</a:t>
+              <a:t>9/2/2024</a:t>
             </a:fld>
             <a:endParaRPr lang="en-US"/>
           </a:p>
@@ -1140,7 +1140,7 @@
           <a:p>
             <a:fld id="{FB4E8B56-EE13-4C77-84B6-FA7DE9B8063B}" type="datetimeFigureOut">
               <a:rPr lang="en-US" smtClean="0"/>
-              <a:t>1/3/2023</a:t>
+              <a:t>9/2/2024</a:t>
             </a:fld>
             <a:endParaRPr lang="en-US"/>
           </a:p>
@@ -1405,7 +1405,7 @@
           <a:p>
             <a:fld id="{FB4E8B56-EE13-4C77-84B6-FA7DE9B8063B}" type="datetimeFigureOut">
               <a:rPr lang="en-US" smtClean="0"/>
-              <a:t>1/3/2023</a:t>
+              <a:t>9/2/2024</a:t>
             </a:fld>
             <a:endParaRPr lang="en-US"/>
           </a:p>
@@ -1817,7 +1817,7 @@
           <a:p>
             <a:fld id="{FB4E8B56-EE13-4C77-84B6-FA7DE9B8063B}" type="datetimeFigureOut">
               <a:rPr lang="en-US" smtClean="0"/>
-              <a:t>1/3/2023</a:t>
+              <a:t>9/2/2024</a:t>
             </a:fld>
             <a:endParaRPr lang="en-US"/>
           </a:p>
@@ -1958,7 +1958,7 @@
           <a:p>
             <a:fld id="{FB4E8B56-EE13-4C77-84B6-FA7DE9B8063B}" type="datetimeFigureOut">
               <a:rPr lang="en-US" smtClean="0"/>
-              <a:t>1/3/2023</a:t>
+              <a:t>9/2/2024</a:t>
             </a:fld>
             <a:endParaRPr lang="en-US"/>
           </a:p>
@@ -2071,7 +2071,7 @@
           <a:p>
             <a:fld id="{FB4E8B56-EE13-4C77-84B6-FA7DE9B8063B}" type="datetimeFigureOut">
               <a:rPr lang="en-US" smtClean="0"/>
-              <a:t>1/3/2023</a:t>
+              <a:t>9/2/2024</a:t>
             </a:fld>
             <a:endParaRPr lang="en-US"/>
           </a:p>
@@ -2382,7 +2382,7 @@
           <a:p>
             <a:fld id="{FB4E8B56-EE13-4C77-84B6-FA7DE9B8063B}" type="datetimeFigureOut">
               <a:rPr lang="en-US" smtClean="0"/>
-              <a:t>1/3/2023</a:t>
+              <a:t>9/2/2024</a:t>
             </a:fld>
             <a:endParaRPr lang="en-US"/>
           </a:p>
@@ -2670,7 +2670,7 @@
           <a:p>
             <a:fld id="{FB4E8B56-EE13-4C77-84B6-FA7DE9B8063B}" type="datetimeFigureOut">
               <a:rPr lang="en-US" smtClean="0"/>
-              <a:t>1/3/2023</a:t>
+              <a:t>9/2/2024</a:t>
             </a:fld>
             <a:endParaRPr lang="en-US"/>
           </a:p>
@@ -2911,7 +2911,7 @@
           <a:p>
             <a:fld id="{FB4E8B56-EE13-4C77-84B6-FA7DE9B8063B}" type="datetimeFigureOut">
               <a:rPr lang="en-US" smtClean="0"/>
-              <a:t>1/3/2023</a:t>
+              <a:t>9/2/2024</a:t>
             </a:fld>
             <a:endParaRPr lang="en-US"/>
           </a:p>
@@ -10007,6 +10007,309 @@
           <a:chExt cx="0" cy="0"/>
         </a:xfrm>
       </p:grpSpPr>
+      <p:sp>
+        <p:nvSpPr>
+          <p:cNvPr id="2" name="Freeform: Shape 1">
+            <a:extLst>
+              <a:ext uri="{FF2B5EF4-FFF2-40B4-BE49-F238E27FC236}">
+                <a16:creationId xmlns:a16="http://schemas.microsoft.com/office/drawing/2014/main" id="{3926671E-BD56-546E-87C7-7C8861B44559}"/>
+              </a:ext>
+            </a:extLst>
+          </p:cNvPr>
+          <p:cNvSpPr/>
+          <p:nvPr/>
+        </p:nvSpPr>
+        <p:spPr>
+          <a:xfrm>
+            <a:off x="6693062" y="2146881"/>
+            <a:ext cx="2045369" cy="2370221"/>
+          </a:xfrm>
+          <a:custGeom>
+            <a:avLst/>
+            <a:gdLst>
+              <a:gd name="connsiteX0" fmla="*/ 0 w 2045369"/>
+              <a:gd name="connsiteY0" fmla="*/ 0 h 2370221"/>
+              <a:gd name="connsiteX1" fmla="*/ 1553581 w 2045369"/>
+              <a:gd name="connsiteY1" fmla="*/ 0 h 2370221"/>
+              <a:gd name="connsiteX2" fmla="*/ 2045369 w 2045369"/>
+              <a:gd name="connsiteY2" fmla="*/ 491789 h 2370221"/>
+              <a:gd name="connsiteX3" fmla="*/ 2045369 w 2045369"/>
+              <a:gd name="connsiteY3" fmla="*/ 2370221 h 2370221"/>
+              <a:gd name="connsiteX4" fmla="*/ 0 w 2045369"/>
+              <a:gd name="connsiteY4" fmla="*/ 2370221 h 2370221"/>
+            </a:gdLst>
+            <a:ahLst/>
+            <a:cxnLst>
+              <a:cxn ang="0">
+                <a:pos x="connsiteX0" y="connsiteY0"/>
+              </a:cxn>
+              <a:cxn ang="0">
+                <a:pos x="connsiteX1" y="connsiteY1"/>
+              </a:cxn>
+              <a:cxn ang="0">
+                <a:pos x="connsiteX2" y="connsiteY2"/>
+              </a:cxn>
+              <a:cxn ang="0">
+                <a:pos x="connsiteX3" y="connsiteY3"/>
+              </a:cxn>
+              <a:cxn ang="0">
+                <a:pos x="connsiteX4" y="connsiteY4"/>
+              </a:cxn>
+            </a:cxnLst>
+            <a:rect l="l" t="t" r="r" b="b"/>
+            <a:pathLst>
+              <a:path w="2045369" h="2370221">
+                <a:moveTo>
+                  <a:pt x="0" y="0"/>
+                </a:moveTo>
+                <a:lnTo>
+                  <a:pt x="1553581" y="0"/>
+                </a:lnTo>
+                <a:lnTo>
+                  <a:pt x="2045369" y="491789"/>
+                </a:lnTo>
+                <a:lnTo>
+                  <a:pt x="2045369" y="2370221"/>
+                </a:lnTo>
+                <a:lnTo>
+                  <a:pt x="0" y="2370221"/>
+                </a:lnTo>
+                <a:close/>
+              </a:path>
+            </a:pathLst>
+          </a:custGeom>
+          <a:solidFill>
+            <a:srgbClr val="FAFFFF"/>
+          </a:solidFill>
+          <a:ln w="76200">
+            <a:solidFill>
+              <a:schemeClr val="tx2"/>
+            </a:solidFill>
+          </a:ln>
+        </p:spPr>
+        <p:style>
+          <a:lnRef idx="2">
+            <a:schemeClr val="accent1">
+              <a:shade val="15000"/>
+            </a:schemeClr>
+          </a:lnRef>
+          <a:fillRef idx="1">
+            <a:schemeClr val="accent1"/>
+          </a:fillRef>
+          <a:effectRef idx="0">
+            <a:schemeClr val="accent1"/>
+          </a:effectRef>
+          <a:fontRef idx="minor">
+            <a:schemeClr val="lt1"/>
+          </a:fontRef>
+        </p:style>
+        <p:txBody>
+          <a:bodyPr wrap="square" rtlCol="0" anchor="ctr">
+            <a:noAutofit/>
+          </a:bodyPr>
+          <a:lstStyle/>
+          <a:p>
+            <a:pPr algn="ctr"/>
+            <a:endParaRPr lang="en-US"/>
+          </a:p>
+        </p:txBody>
+      </p:sp>
+      <p:sp>
+        <p:nvSpPr>
+          <p:cNvPr id="3" name="Freeform: Shape 2">
+            <a:extLst>
+              <a:ext uri="{FF2B5EF4-FFF2-40B4-BE49-F238E27FC236}">
+                <a16:creationId xmlns:a16="http://schemas.microsoft.com/office/drawing/2014/main" id="{3D480A20-4E68-C907-97A4-8FCE2B3D5799}"/>
+              </a:ext>
+            </a:extLst>
+          </p:cNvPr>
+          <p:cNvSpPr/>
+          <p:nvPr/>
+        </p:nvSpPr>
+        <p:spPr>
+          <a:xfrm>
+            <a:off x="8233105" y="2146881"/>
+            <a:ext cx="505326" cy="517359"/>
+          </a:xfrm>
+          <a:custGeom>
+            <a:avLst/>
+            <a:gdLst>
+              <a:gd name="connsiteX0" fmla="*/ 0 w 505326"/>
+              <a:gd name="connsiteY0" fmla="*/ 0 h 517359"/>
+              <a:gd name="connsiteX1" fmla="*/ 13538 w 505326"/>
+              <a:gd name="connsiteY1" fmla="*/ 0 h 517359"/>
+              <a:gd name="connsiteX2" fmla="*/ 505326 w 505326"/>
+              <a:gd name="connsiteY2" fmla="*/ 491789 h 517359"/>
+              <a:gd name="connsiteX3" fmla="*/ 505326 w 505326"/>
+              <a:gd name="connsiteY3" fmla="*/ 517359 h 517359"/>
+              <a:gd name="connsiteX4" fmla="*/ 0 w 505326"/>
+              <a:gd name="connsiteY4" fmla="*/ 517359 h 517359"/>
+            </a:gdLst>
+            <a:ahLst/>
+            <a:cxnLst>
+              <a:cxn ang="0">
+                <a:pos x="connsiteX0" y="connsiteY0"/>
+              </a:cxn>
+              <a:cxn ang="0">
+                <a:pos x="connsiteX1" y="connsiteY1"/>
+              </a:cxn>
+              <a:cxn ang="0">
+                <a:pos x="connsiteX2" y="connsiteY2"/>
+              </a:cxn>
+              <a:cxn ang="0">
+                <a:pos x="connsiteX3" y="connsiteY3"/>
+              </a:cxn>
+              <a:cxn ang="0">
+                <a:pos x="connsiteX4" y="connsiteY4"/>
+              </a:cxn>
+            </a:cxnLst>
+            <a:rect l="l" t="t" r="r" b="b"/>
+            <a:pathLst>
+              <a:path w="505326" h="517359">
+                <a:moveTo>
+                  <a:pt x="0" y="0"/>
+                </a:moveTo>
+                <a:lnTo>
+                  <a:pt x="13538" y="0"/>
+                </a:lnTo>
+                <a:lnTo>
+                  <a:pt x="505326" y="491789"/>
+                </a:lnTo>
+                <a:lnTo>
+                  <a:pt x="505326" y="517359"/>
+                </a:lnTo>
+                <a:lnTo>
+                  <a:pt x="0" y="517359"/>
+                </a:lnTo>
+                <a:close/>
+              </a:path>
+            </a:pathLst>
+          </a:custGeom>
+          <a:solidFill>
+            <a:schemeClr val="accent1">
+              <a:lumMod val="20000"/>
+              <a:lumOff val="80000"/>
+            </a:schemeClr>
+          </a:solidFill>
+          <a:ln w="76200">
+            <a:solidFill>
+              <a:schemeClr val="tx2"/>
+            </a:solidFill>
+          </a:ln>
+        </p:spPr>
+        <p:style>
+          <a:lnRef idx="2">
+            <a:schemeClr val="accent1">
+              <a:shade val="15000"/>
+            </a:schemeClr>
+          </a:lnRef>
+          <a:fillRef idx="1">
+            <a:schemeClr val="accent1"/>
+          </a:fillRef>
+          <a:effectRef idx="0">
+            <a:schemeClr val="accent1"/>
+          </a:effectRef>
+          <a:fontRef idx="minor">
+            <a:schemeClr val="lt1"/>
+          </a:fontRef>
+        </p:style>
+        <p:txBody>
+          <a:bodyPr wrap="square" rtlCol="0" anchor="ctr">
+            <a:noAutofit/>
+          </a:bodyPr>
+          <a:lstStyle/>
+          <a:p>
+            <a:pPr algn="ctr"/>
+            <a:endParaRPr lang="en-US"/>
+          </a:p>
+        </p:txBody>
+      </p:sp>
+      <p:pic>
+        <p:nvPicPr>
+          <p:cNvPr id="10" name="Picture 9">
+            <a:extLst>
+              <a:ext uri="{FF2B5EF4-FFF2-40B4-BE49-F238E27FC236}">
+                <a16:creationId xmlns:a16="http://schemas.microsoft.com/office/drawing/2014/main" id="{E2FB9693-AB5C-5717-C424-E3F089867544}"/>
+              </a:ext>
+            </a:extLst>
+          </p:cNvPr>
+          <p:cNvPicPr>
+            <a:picLocks noChangeAspect="1"/>
+          </p:cNvPicPr>
+          <p:nvPr/>
+        </p:nvPicPr>
+        <p:blipFill>
+          <a:blip r:embed="rId2">
+            <a:extLst>
+              <a:ext uri="{BEBA8EAE-BF5A-486C-A8C5-ECC9F3942E4B}">
+                <a14:imgProps xmlns:a14="http://schemas.microsoft.com/office/drawing/2010/main">
+                  <a14:imgLayer r:embed="rId3">
+                    <a14:imgEffect>
+                      <a14:backgroundRemoval t="10000" b="95238" l="10000" r="90000">
+                        <a14:foregroundMark x1="47321" y1="91667" x2="48214" y2="95238"/>
+                      </a14:backgroundRemoval>
+                    </a14:imgEffect>
+                  </a14:imgLayer>
+                </a14:imgProps>
+              </a:ext>
+            </a:extLst>
+          </a:blip>
+          <a:stretch>
+            <a:fillRect/>
+          </a:stretch>
+        </p:blipFill>
+        <p:spPr>
+          <a:xfrm>
+            <a:off x="6516859" y="2438417"/>
+            <a:ext cx="2382864" cy="1787148"/>
+          </a:xfrm>
+          <a:prstGeom prst="rect">
+            <a:avLst/>
+          </a:prstGeom>
+        </p:spPr>
+      </p:pic>
+      <p:sp>
+        <p:nvSpPr>
+          <p:cNvPr id="21" name="TextBox 20">
+            <a:extLst>
+              <a:ext uri="{FF2B5EF4-FFF2-40B4-BE49-F238E27FC236}">
+                <a16:creationId xmlns:a16="http://schemas.microsoft.com/office/drawing/2014/main" id="{A461A143-B045-9818-16B3-EA99DBC808DC}"/>
+              </a:ext>
+            </a:extLst>
+          </p:cNvPr>
+          <p:cNvSpPr txBox="1"/>
+          <p:nvPr/>
+        </p:nvSpPr>
+        <p:spPr>
+          <a:xfrm>
+            <a:off x="7334070" y="4560900"/>
+            <a:ext cx="763351" cy="461665"/>
+          </a:xfrm>
+          <a:prstGeom prst="rect">
+            <a:avLst/>
+          </a:prstGeom>
+          <a:noFill/>
+        </p:spPr>
+        <p:txBody>
+          <a:bodyPr wrap="none" rtlCol="0">
+            <a:spAutoFit/>
+          </a:bodyPr>
+          <a:lstStyle/>
+          <a:p>
+            <a:r>
+              <a:rPr lang="en-US" altLang="ko-KR" sz="2400" dirty="0" err="1">
+                <a:latin typeface="나눔고딕 ExtraBold" panose="020D0904000000000000" pitchFamily="50" charset="-127"/>
+                <a:ea typeface="나눔고딕 ExtraBold" panose="020D0904000000000000" pitchFamily="50" charset="-127"/>
+              </a:rPr>
+              <a:t>mex</a:t>
+            </a:r>
+            <a:endParaRPr lang="en-US" sz="2400" dirty="0">
+              <a:latin typeface="나눔고딕 ExtraBold" panose="020D0904000000000000" pitchFamily="50" charset="-127"/>
+              <a:ea typeface="나눔고딕 ExtraBold" panose="020D0904000000000000" pitchFamily="50" charset="-127"/>
+            </a:endParaRPr>
+          </a:p>
+        </p:txBody>
+      </p:sp>
     </p:spTree>
     <p:extLst>
       <p:ext uri="{BB962C8B-B14F-4D97-AF65-F5344CB8AC3E}">

</xml_diff>